<commit_message>
Update Project Presentation_Group NaN.pptx
</commit_message>
<xml_diff>
--- a/Project Presentation_Group NaN.pptx
+++ b/Project Presentation_Group NaN.pptx
@@ -232,7 +232,7 @@
           <a:p>
             <a:fld id="{BB3F2993-6B8D-DC47-A633-B057AAF899C1}" type="datetimeFigureOut">
               <a:rPr lang="en-US" smtClean="0"/>
-              <a:t>12/20/2019</a:t>
+              <a:t>2/20/2020</a:t>
             </a:fld>
             <a:endParaRPr lang="en-US"/>
           </a:p>
@@ -2676,7 +2676,7 @@
           <a:p>
             <a:fld id="{D0E2D15B-292A-0845-A756-C042EAD3DA6B}" type="datetime1">
               <a:rPr lang="fr-FR" smtClean="0"/>
-              <a:t>20/12/2019</a:t>
+              <a:t>20/02/2020</a:t>
             </a:fld>
             <a:endParaRPr lang="en-US"/>
           </a:p>
@@ -2846,7 +2846,7 @@
           <a:p>
             <a:fld id="{A11040B3-7DCB-6D4E-8370-CD5B186DB1AA}" type="datetime1">
               <a:rPr lang="fr-FR" smtClean="0"/>
-              <a:t>20/12/2019</a:t>
+              <a:t>20/02/2020</a:t>
             </a:fld>
             <a:endParaRPr lang="en-US"/>
           </a:p>
@@ -3026,7 +3026,7 @@
           <a:p>
             <a:fld id="{82AC91B7-AFC2-1F42-AECC-80B400C058B8}" type="datetime1">
               <a:rPr lang="fr-FR" smtClean="0"/>
-              <a:t>20/12/2019</a:t>
+              <a:t>20/02/2020</a:t>
             </a:fld>
             <a:endParaRPr lang="en-US"/>
           </a:p>
@@ -3196,7 +3196,7 @@
           <a:p>
             <a:fld id="{696A3EBC-A5FD-D244-BA2F-C253F095B50E}" type="datetime1">
               <a:rPr lang="fr-FR" smtClean="0"/>
-              <a:t>20/12/2019</a:t>
+              <a:t>20/02/2020</a:t>
             </a:fld>
             <a:endParaRPr lang="en-US"/>
           </a:p>
@@ -3442,7 +3442,7 @@
           <a:p>
             <a:fld id="{1ED2D5BA-2580-E54E-B52C-6936A1019B68}" type="datetime1">
               <a:rPr lang="fr-FR" smtClean="0"/>
-              <a:t>20/12/2019</a:t>
+              <a:t>20/02/2020</a:t>
             </a:fld>
             <a:endParaRPr lang="en-US"/>
           </a:p>
@@ -3674,7 +3674,7 @@
           <a:p>
             <a:fld id="{06FC2916-7B9C-AA46-A3AB-7484E9ECBBAB}" type="datetime1">
               <a:rPr lang="fr-FR" smtClean="0"/>
-              <a:t>20/12/2019</a:t>
+              <a:t>20/02/2020</a:t>
             </a:fld>
             <a:endParaRPr lang="en-US"/>
           </a:p>
@@ -4041,7 +4041,7 @@
           <a:p>
             <a:fld id="{4F1CB3E6-D1C5-B049-B138-478DCA71665F}" type="datetime1">
               <a:rPr lang="fr-FR" smtClean="0"/>
-              <a:t>20/12/2019</a:t>
+              <a:t>20/02/2020</a:t>
             </a:fld>
             <a:endParaRPr lang="en-US"/>
           </a:p>
@@ -4159,7 +4159,7 @@
           <a:p>
             <a:fld id="{3209C9D4-417C-D042-8D41-167A6A632345}" type="datetime1">
               <a:rPr lang="fr-FR" smtClean="0"/>
-              <a:t>20/12/2019</a:t>
+              <a:t>20/02/2020</a:t>
             </a:fld>
             <a:endParaRPr lang="en-US"/>
           </a:p>
@@ -4254,7 +4254,7 @@
           <a:p>
             <a:fld id="{A1BD9679-972A-7049-9E61-4AB53D530508}" type="datetime1">
               <a:rPr lang="fr-FR" smtClean="0"/>
-              <a:t>20/12/2019</a:t>
+              <a:t>20/02/2020</a:t>
             </a:fld>
             <a:endParaRPr lang="en-US"/>
           </a:p>
@@ -4531,7 +4531,7 @@
           <a:p>
             <a:fld id="{7DB6AC60-E53C-C04A-9993-8E8AC45234BA}" type="datetime1">
               <a:rPr lang="fr-FR" smtClean="0"/>
-              <a:t>20/12/2019</a:t>
+              <a:t>20/02/2020</a:t>
             </a:fld>
             <a:endParaRPr lang="en-US"/>
           </a:p>
@@ -4788,7 +4788,7 @@
           <a:p>
             <a:fld id="{A2DD50FC-5985-114C-850B-3BE073FD1062}" type="datetime1">
               <a:rPr lang="fr-FR" smtClean="0"/>
-              <a:t>20/12/2019</a:t>
+              <a:t>20/02/2020</a:t>
             </a:fld>
             <a:endParaRPr lang="en-US"/>
           </a:p>
@@ -5001,7 +5001,7 @@
           <a:p>
             <a:fld id="{6DA7C75C-E186-E84C-9066-7BD7F4C2F9B2}" type="datetime1">
               <a:rPr lang="fr-FR" smtClean="0"/>
-              <a:t>20/12/2019</a:t>
+              <a:t>20/02/2020</a:t>
             </a:fld>
             <a:endParaRPr lang="en-US"/>
           </a:p>
@@ -5846,220 +5846,6 @@
       </p:cxnSp>
       <p:sp>
         <p:nvSpPr>
-          <p:cNvPr id="27" name="Rectangle 6">
-            <a:extLst>
-              <a:ext uri="{FF2B5EF4-FFF2-40B4-BE49-F238E27FC236}">
-                <a16:creationId xmlns:a16="http://schemas.microsoft.com/office/drawing/2014/main" id="{E97AFFCC-C5D0-6E4C-9024-FAFFF4197D3B}"/>
-              </a:ext>
-            </a:extLst>
-          </p:cNvPr>
-          <p:cNvSpPr>
-            <a:spLocks noChangeArrowheads="1"/>
-          </p:cNvSpPr>
-          <p:nvPr/>
-        </p:nvSpPr>
-        <p:spPr bwMode="auto">
-          <a:xfrm>
-            <a:off x="6416049" y="205640"/>
-            <a:ext cx="1628311" cy="230701"/>
-          </a:xfrm>
-          <a:prstGeom prst="rect">
-            <a:avLst/>
-          </a:prstGeom>
-          <a:solidFill>
-            <a:srgbClr val="36245A"/>
-          </a:solidFill>
-          <a:ln>
-            <a:noFill/>
-          </a:ln>
-        </p:spPr>
-        <p:txBody>
-          <a:bodyPr wrap="square" lIns="0" tIns="0" rIns="0" bIns="0" anchor="ctr" anchorCtr="0">
-            <a:noAutofit/>
-          </a:bodyPr>
-          <a:lstStyle>
-            <a:lvl1pPr defTabSz="715963">
-              <a:defRPr>
-                <a:solidFill>
-                  <a:schemeClr val="tx1"/>
-                </a:solidFill>
-                <a:latin typeface="Calibri" pitchFamily="34" charset="0"/>
-                <a:cs typeface="Arial" charset="0"/>
-              </a:defRPr>
-            </a:lvl1pPr>
-            <a:lvl2pPr defTabSz="715963">
-              <a:defRPr>
-                <a:solidFill>
-                  <a:schemeClr val="tx1"/>
-                </a:solidFill>
-                <a:latin typeface="Calibri" pitchFamily="34" charset="0"/>
-                <a:cs typeface="Arial" charset="0"/>
-              </a:defRPr>
-            </a:lvl2pPr>
-            <a:lvl3pPr defTabSz="715963">
-              <a:defRPr>
-                <a:solidFill>
-                  <a:schemeClr val="tx1"/>
-                </a:solidFill>
-                <a:latin typeface="Calibri" pitchFamily="34" charset="0"/>
-                <a:cs typeface="Arial" charset="0"/>
-              </a:defRPr>
-            </a:lvl3pPr>
-            <a:lvl4pPr defTabSz="715963">
-              <a:defRPr>
-                <a:solidFill>
-                  <a:schemeClr val="tx1"/>
-                </a:solidFill>
-                <a:latin typeface="Calibri" pitchFamily="34" charset="0"/>
-                <a:cs typeface="Arial" charset="0"/>
-              </a:defRPr>
-            </a:lvl4pPr>
-            <a:lvl5pPr defTabSz="715963">
-              <a:defRPr>
-                <a:solidFill>
-                  <a:schemeClr val="tx1"/>
-                </a:solidFill>
-                <a:latin typeface="Calibri" pitchFamily="34" charset="0"/>
-                <a:cs typeface="Arial" charset="0"/>
-              </a:defRPr>
-            </a:lvl5pPr>
-            <a:lvl6pPr marL="2263775" indent="22225" defTabSz="715963" eaLnBrk="0" fontAlgn="base" hangingPunct="0">
-              <a:spcBef>
-                <a:spcPct val="0"/>
-              </a:spcBef>
-              <a:spcAft>
-                <a:spcPct val="0"/>
-              </a:spcAft>
-              <a:defRPr>
-                <a:solidFill>
-                  <a:schemeClr val="tx1"/>
-                </a:solidFill>
-                <a:latin typeface="Calibri" pitchFamily="34" charset="0"/>
-                <a:cs typeface="Arial" charset="0"/>
-              </a:defRPr>
-            </a:lvl6pPr>
-            <a:lvl7pPr marL="2720975" indent="22225" defTabSz="715963" eaLnBrk="0" fontAlgn="base" hangingPunct="0">
-              <a:spcBef>
-                <a:spcPct val="0"/>
-              </a:spcBef>
-              <a:spcAft>
-                <a:spcPct val="0"/>
-              </a:spcAft>
-              <a:defRPr>
-                <a:solidFill>
-                  <a:schemeClr val="tx1"/>
-                </a:solidFill>
-                <a:latin typeface="Calibri" pitchFamily="34" charset="0"/>
-                <a:cs typeface="Arial" charset="0"/>
-              </a:defRPr>
-            </a:lvl7pPr>
-            <a:lvl8pPr marL="3178175" indent="22225" defTabSz="715963" eaLnBrk="0" fontAlgn="base" hangingPunct="0">
-              <a:spcBef>
-                <a:spcPct val="0"/>
-              </a:spcBef>
-              <a:spcAft>
-                <a:spcPct val="0"/>
-              </a:spcAft>
-              <a:defRPr>
-                <a:solidFill>
-                  <a:schemeClr val="tx1"/>
-                </a:solidFill>
-                <a:latin typeface="Calibri" pitchFamily="34" charset="0"/>
-                <a:cs typeface="Arial" charset="0"/>
-              </a:defRPr>
-            </a:lvl8pPr>
-            <a:lvl9pPr marL="3635375" indent="22225" defTabSz="715963" eaLnBrk="0" fontAlgn="base" hangingPunct="0">
-              <a:spcBef>
-                <a:spcPct val="0"/>
-              </a:spcBef>
-              <a:spcAft>
-                <a:spcPct val="0"/>
-              </a:spcAft>
-              <a:defRPr>
-                <a:solidFill>
-                  <a:schemeClr val="tx1"/>
-                </a:solidFill>
-                <a:latin typeface="Calibri" pitchFamily="34" charset="0"/>
-                <a:cs typeface="Arial" charset="0"/>
-              </a:defRPr>
-            </a:lvl9pPr>
-          </a:lstStyle>
-          <a:p>
-            <a:pPr marL="251687" lvl="1" eaLnBrk="0" fontAlgn="base" hangingPunct="0">
-              <a:spcBef>
-                <a:spcPct val="0"/>
-              </a:spcBef>
-              <a:spcAft>
-                <a:spcPct val="0"/>
-              </a:spcAft>
-              <a:buSzPct val="120000"/>
-            </a:pPr>
-            <a:r>
-              <a:rPr lang="en-US" altLang="ko-KR" sz="1000" b="1" dirty="0">
-                <a:solidFill>
-                  <a:srgbClr val="FFFFFF"/>
-                </a:solidFill>
-                <a:ea typeface="Gulim" pitchFamily="34" charset="-127"/>
-              </a:rPr>
-              <a:t>Feature selection</a:t>
-            </a:r>
-          </a:p>
-        </p:txBody>
-      </p:sp>
-      <p:sp>
-        <p:nvSpPr>
-          <p:cNvPr id="28" name="Ellipse 14">
-            <a:extLst>
-              <a:ext uri="{FF2B5EF4-FFF2-40B4-BE49-F238E27FC236}">
-                <a16:creationId xmlns:a16="http://schemas.microsoft.com/office/drawing/2014/main" id="{EA8D302C-87EE-5A4B-AFB6-8C7D9D51C1A6}"/>
-              </a:ext>
-            </a:extLst>
-          </p:cNvPr>
-          <p:cNvSpPr/>
-          <p:nvPr/>
-        </p:nvSpPr>
-        <p:spPr>
-          <a:xfrm>
-            <a:off x="5747250" y="117301"/>
-            <a:ext cx="274154" cy="265669"/>
-          </a:xfrm>
-          <a:prstGeom prst="ellipse">
-            <a:avLst/>
-          </a:prstGeom>
-          <a:solidFill>
-            <a:srgbClr val="FFFFFF"/>
-          </a:solidFill>
-          <a:ln w="28575" cap="flat" cmpd="sng" algn="ctr">
-            <a:solidFill>
-              <a:srgbClr val="36245A"/>
-            </a:solidFill>
-            <a:prstDash val="solid"/>
-          </a:ln>
-          <a:effectLst/>
-        </p:spPr>
-        <p:txBody>
-          <a:bodyPr rtlCol="0" anchor="ctr">
-            <a:noAutofit/>
-          </a:bodyPr>
-          <a:lstStyle/>
-          <a:p>
-            <a:pPr algn="ctr" defTabSz="685800">
-              <a:buSzPct val="85000"/>
-              <a:defRPr/>
-            </a:pPr>
-            <a:endParaRPr lang="fr-FR" sz="1000" kern="0" dirty="0">
-              <a:solidFill>
-                <a:srgbClr val="FFFFFF"/>
-              </a:solidFill>
-              <a:latin typeface="Calibri"/>
-              <a:ea typeface=""/>
-              <a:cs typeface=""/>
-            </a:endParaRPr>
-          </a:p>
-        </p:txBody>
-      </p:sp>
-      <p:sp>
-        <p:nvSpPr>
           <p:cNvPr id="30" name="Rectangle 6">
             <a:extLst>
               <a:ext uri="{FF2B5EF4-FFF2-40B4-BE49-F238E27FC236}">
@@ -6274,7 +6060,7 @@
       </p:sp>
       <p:pic>
         <p:nvPicPr>
-          <p:cNvPr id="4102" name="Picture 6" descr="mage result for choice icon"/>
+          <p:cNvPr id="4106" name="Picture 10" descr="elated image"/>
           <p:cNvPicPr>
             <a:picLocks noChangeAspect="1" noChangeArrowheads="1"/>
           </p:cNvPicPr>
@@ -6282,47 +6068,6 @@
         </p:nvPicPr>
         <p:blipFill>
           <a:blip r:embed="rId3">
-            <a:extLst>
-              <a:ext uri="{28A0092B-C50C-407E-A947-70E740481C1C}">
-                <a14:useLocalDpi xmlns:a14="http://schemas.microsoft.com/office/drawing/2010/main" val="0"/>
-              </a:ext>
-            </a:extLst>
-          </a:blip>
-          <a:srcRect/>
-          <a:stretch>
-            <a:fillRect/>
-          </a:stretch>
-        </p:blipFill>
-        <p:spPr bwMode="auto">
-          <a:xfrm>
-            <a:off x="5806583" y="134304"/>
-            <a:ext cx="155487" cy="224252"/>
-          </a:xfrm>
-          <a:prstGeom prst="rect">
-            <a:avLst/>
-          </a:prstGeom>
-          <a:noFill/>
-          <a:extLst>
-            <a:ext uri="{909E8E84-426E-40DD-AFC4-6F175D3DCCD1}">
-              <a14:hiddenFill xmlns:a14="http://schemas.microsoft.com/office/drawing/2010/main">
-                <a:solidFill>
-                  <a:srgbClr val="FFFFFF"/>
-                </a:solidFill>
-              </a14:hiddenFill>
-            </a:ext>
-          </a:extLst>
-        </p:spPr>
-      </p:pic>
-      <p:pic>
-        <p:nvPicPr>
-          <p:cNvPr id="4106" name="Picture 10" descr="elated image"/>
-          <p:cNvPicPr>
-            <a:picLocks noChangeAspect="1" noChangeArrowheads="1"/>
-          </p:cNvPicPr>
-          <p:nvPr/>
-        </p:nvPicPr>
-        <p:blipFill>
-          <a:blip r:embed="rId4">
             <a:grayscl/>
             <a:extLst>
               <a:ext uri="{28A0092B-C50C-407E-A947-70E740481C1C}">
@@ -6787,7 +6532,7 @@
           <p:nvPr/>
         </p:nvPicPr>
         <p:blipFill rotWithShape="1">
-          <a:blip r:embed="rId5">
+          <a:blip r:embed="rId4">
             <a:alphaModFix/>
           </a:blip>
           <a:srcRect/>
@@ -6883,7 +6628,7 @@
           <p:nvPr/>
         </p:nvPicPr>
         <p:blipFill>
-          <a:blip r:embed="rId6">
+          <a:blip r:embed="rId5">
             <a:extLst>
               <a:ext uri="{28A0092B-C50C-407E-A947-70E740481C1C}">
                 <a14:useLocalDpi xmlns:a14="http://schemas.microsoft.com/office/drawing/2010/main" val="0"/>

</xml_diff>